<commit_message>
add TEDx_Wachtlijst disable TEDx_Voorinschrijving
</commit_message>
<xml_diff>
--- a/tedxamstelveen-2019.pptx
+++ b/tedxamstelveen-2019.pptx
@@ -5,15 +5,17 @@
     <p:sldMasterId id="2147483684" r:id="rId1"/>
   </p:sldMasterIdLst>
   <p:notesMasterIdLst>
-    <p:notesMasterId r:id="rId5"/>
+    <p:notesMasterId r:id="rId7"/>
   </p:notesMasterIdLst>
   <p:handoutMasterIdLst>
-    <p:handoutMasterId r:id="rId6"/>
+    <p:handoutMasterId r:id="rId8"/>
   </p:handoutMasterIdLst>
   <p:sldIdLst>
-    <p:sldId id="256" r:id="rId2"/>
-    <p:sldId id="259" r:id="rId3"/>
-    <p:sldId id="260" r:id="rId4"/>
+    <p:sldId id="260" r:id="rId2"/>
+    <p:sldId id="262" r:id="rId3"/>
+    <p:sldId id="263" r:id="rId4"/>
+    <p:sldId id="264" r:id="rId5"/>
+    <p:sldId id="261" r:id="rId6"/>
   </p:sldIdLst>
   <p:sldSz cx="12192000" cy="6858000"/>
   <p:notesSz cx="6858000" cy="9144000"/>
@@ -202,7 +204,7 @@
           <a:p>
             <a:fld id="{15E150AF-FB20-7549-8EBD-91871A75589D}" type="datetimeFigureOut">
               <a:rPr lang="en-US" smtClean="0"/>
-              <a:t>1/19/19</a:t>
+              <a:t>2/6/19</a:t>
             </a:fld>
             <a:endParaRPr lang="en-US"/>
           </a:p>
@@ -367,7 +369,7 @@
           <a:p>
             <a:fld id="{38B8A568-4DDB-4D44-8804-F2D344CBA7D9}" type="datetimeFigureOut">
               <a:rPr lang="en-US" smtClean="0"/>
-              <a:t>1/19/19</a:t>
+              <a:t>2/6/19</a:t>
             </a:fld>
             <a:endParaRPr lang="en-US"/>
           </a:p>
@@ -632,6 +634,621 @@
     </a:lvl9pPr>
   </p:notesStyle>
 </p:notesMaster>
+</file>
+
+<file path=ppt/notesSlides/notesSlide1.xml><?xml version="1.0" encoding="utf-8"?>
+<p:notes xmlns:a="http://schemas.openxmlformats.org/drawingml/2006/main" xmlns:r="http://schemas.openxmlformats.org/officeDocument/2006/relationships" xmlns:p="http://schemas.openxmlformats.org/presentationml/2006/main">
+  <p:cSld>
+    <p:spTree>
+      <p:nvGrpSpPr>
+        <p:cNvPr id="1" name=""/>
+        <p:cNvGrpSpPr/>
+        <p:nvPr/>
+      </p:nvGrpSpPr>
+      <p:grpSpPr>
+        <a:xfrm>
+          <a:off x="0" y="0"/>
+          <a:ext cx="0" cy="0"/>
+          <a:chOff x="0" y="0"/>
+          <a:chExt cx="0" cy="0"/>
+        </a:xfrm>
+      </p:grpSpPr>
+      <p:sp>
+        <p:nvSpPr>
+          <p:cNvPr id="2" name="Slide Image Placeholder 1"/>
+          <p:cNvSpPr>
+            <a:spLocks noGrp="1" noRot="1" noChangeAspect="1"/>
+          </p:cNvSpPr>
+          <p:nvPr>
+            <p:ph type="sldImg"/>
+          </p:nvPr>
+        </p:nvSpPr>
+        <p:spPr/>
+      </p:sp>
+      <p:sp>
+        <p:nvSpPr>
+          <p:cNvPr id="3" name="Notes Placeholder 2"/>
+          <p:cNvSpPr>
+            <a:spLocks noGrp="1"/>
+          </p:cNvSpPr>
+          <p:nvPr>
+            <p:ph type="body" idx="1"/>
+          </p:nvPr>
+        </p:nvSpPr>
+        <p:spPr/>
+        <p:txBody>
+          <a:bodyPr/>
+          <a:lstStyle/>
+          <a:p>
+            <a:r>
+              <a:rPr lang="en-US"/>
+              <a:t>Opmerking:</a:t>
+            </a:r>
+          </a:p>
+          <a:p>
+            <a:endParaRPr lang="en-US"/>
+          </a:p>
+          <a:p>
+            <a:r>
+              <a:rPr lang="en-US"/>
+              <a:t>Deze slide gebruiken als title, photos, video of dergelijke.</a:t>
+            </a:r>
+          </a:p>
+          <a:p>
+            <a:endParaRPr lang="en-US"/>
+          </a:p>
+          <a:p>
+            <a:r>
+              <a:rPr lang="en-US"/>
+              <a:t>AUB gecomprimeerde fotos gebruiken</a:t>
+            </a:r>
+          </a:p>
+          <a:p>
+            <a:endParaRPr lang="en-US"/>
+          </a:p>
+          <a:p>
+            <a:r>
+              <a:rPr lang="en-US"/>
+              <a:t>Indien video test of deze automatisch start</a:t>
+            </a:r>
+          </a:p>
+          <a:p>
+            <a:endParaRPr lang="en-US"/>
+          </a:p>
+          <a:p>
+            <a:r>
+              <a:rPr lang="en-US"/>
+              <a:t>Indien vragen mail ray@tedxamstelveen.com</a:t>
+            </a:r>
+          </a:p>
+        </p:txBody>
+      </p:sp>
+      <p:sp>
+        <p:nvSpPr>
+          <p:cNvPr id="4" name="Slide Number Placeholder 3"/>
+          <p:cNvSpPr>
+            <a:spLocks noGrp="1"/>
+          </p:cNvSpPr>
+          <p:nvPr>
+            <p:ph type="sldNum" sz="quarter" idx="5"/>
+          </p:nvPr>
+        </p:nvSpPr>
+        <p:spPr/>
+        <p:txBody>
+          <a:bodyPr/>
+          <a:lstStyle/>
+          <a:p>
+            <a:fld id="{E0FBD6F4-CD9B-584A-A34E-649C473A2777}" type="slidenum">
+              <a:rPr lang="en-US" smtClean="0"/>
+              <a:t>1</a:t>
+            </a:fld>
+            <a:endParaRPr lang="en-US"/>
+          </a:p>
+        </p:txBody>
+      </p:sp>
+    </p:spTree>
+    <p:extLst>
+      <p:ext uri="{BB962C8B-B14F-4D97-AF65-F5344CB8AC3E}">
+        <p14:creationId xmlns:p14="http://schemas.microsoft.com/office/powerpoint/2010/main" val="3832553799"/>
+      </p:ext>
+    </p:extLst>
+  </p:cSld>
+  <p:clrMapOvr>
+    <a:masterClrMapping/>
+  </p:clrMapOvr>
+</p:notes>
+</file>
+
+<file path=ppt/notesSlides/notesSlide2.xml><?xml version="1.0" encoding="utf-8"?>
+<p:notes xmlns:a="http://schemas.openxmlformats.org/drawingml/2006/main" xmlns:r="http://schemas.openxmlformats.org/officeDocument/2006/relationships" xmlns:p="http://schemas.openxmlformats.org/presentationml/2006/main">
+  <p:cSld>
+    <p:spTree>
+      <p:nvGrpSpPr>
+        <p:cNvPr id="1" name=""/>
+        <p:cNvGrpSpPr/>
+        <p:nvPr/>
+      </p:nvGrpSpPr>
+      <p:grpSpPr>
+        <a:xfrm>
+          <a:off x="0" y="0"/>
+          <a:ext cx="0" cy="0"/>
+          <a:chOff x="0" y="0"/>
+          <a:chExt cx="0" cy="0"/>
+        </a:xfrm>
+      </p:grpSpPr>
+      <p:sp>
+        <p:nvSpPr>
+          <p:cNvPr id="2" name="Slide Image Placeholder 1"/>
+          <p:cNvSpPr>
+            <a:spLocks noGrp="1" noRot="1" noChangeAspect="1"/>
+          </p:cNvSpPr>
+          <p:nvPr>
+            <p:ph type="sldImg"/>
+          </p:nvPr>
+        </p:nvSpPr>
+        <p:spPr/>
+      </p:sp>
+      <p:sp>
+        <p:nvSpPr>
+          <p:cNvPr id="3" name="Notes Placeholder 2"/>
+          <p:cNvSpPr>
+            <a:spLocks noGrp="1"/>
+          </p:cNvSpPr>
+          <p:nvPr>
+            <p:ph type="body" idx="1"/>
+          </p:nvPr>
+        </p:nvSpPr>
+        <p:spPr/>
+        <p:txBody>
+          <a:bodyPr/>
+          <a:lstStyle/>
+          <a:p>
+            <a:r>
+              <a:rPr lang="en-US"/>
+              <a:t>Opmerking:</a:t>
+            </a:r>
+          </a:p>
+          <a:p>
+            <a:endParaRPr lang="en-US"/>
+          </a:p>
+          <a:p>
+            <a:r>
+              <a:rPr lang="en-US"/>
+              <a:t>Deze slide gebruiken als title, photos, video of dergelijke.</a:t>
+            </a:r>
+          </a:p>
+          <a:p>
+            <a:endParaRPr lang="en-US"/>
+          </a:p>
+          <a:p>
+            <a:r>
+              <a:rPr lang="en-US"/>
+              <a:t>AUB gecomprimeerde fotos gebruiken</a:t>
+            </a:r>
+          </a:p>
+          <a:p>
+            <a:endParaRPr lang="en-US"/>
+          </a:p>
+          <a:p>
+            <a:r>
+              <a:rPr lang="en-US"/>
+              <a:t>Indien video test of deze automatisch start</a:t>
+            </a:r>
+          </a:p>
+          <a:p>
+            <a:endParaRPr lang="en-US"/>
+          </a:p>
+          <a:p>
+            <a:r>
+              <a:rPr lang="en-US"/>
+              <a:t>Indien vragen mail ray@tedxamstelveen.com</a:t>
+            </a:r>
+          </a:p>
+        </p:txBody>
+      </p:sp>
+      <p:sp>
+        <p:nvSpPr>
+          <p:cNvPr id="4" name="Slide Number Placeholder 3"/>
+          <p:cNvSpPr>
+            <a:spLocks noGrp="1"/>
+          </p:cNvSpPr>
+          <p:nvPr>
+            <p:ph type="sldNum" sz="quarter" idx="5"/>
+          </p:nvPr>
+        </p:nvSpPr>
+        <p:spPr/>
+        <p:txBody>
+          <a:bodyPr/>
+          <a:lstStyle/>
+          <a:p>
+            <a:fld id="{E0FBD6F4-CD9B-584A-A34E-649C473A2777}" type="slidenum">
+              <a:rPr lang="en-US" smtClean="0"/>
+              <a:t>2</a:t>
+            </a:fld>
+            <a:endParaRPr lang="en-US"/>
+          </a:p>
+        </p:txBody>
+      </p:sp>
+    </p:spTree>
+    <p:extLst>
+      <p:ext uri="{BB962C8B-B14F-4D97-AF65-F5344CB8AC3E}">
+        <p14:creationId xmlns:p14="http://schemas.microsoft.com/office/powerpoint/2010/main" val="2035498675"/>
+      </p:ext>
+    </p:extLst>
+  </p:cSld>
+  <p:clrMapOvr>
+    <a:masterClrMapping/>
+  </p:clrMapOvr>
+</p:notes>
+</file>
+
+<file path=ppt/notesSlides/notesSlide3.xml><?xml version="1.0" encoding="utf-8"?>
+<p:notes xmlns:a="http://schemas.openxmlformats.org/drawingml/2006/main" xmlns:r="http://schemas.openxmlformats.org/officeDocument/2006/relationships" xmlns:p="http://schemas.openxmlformats.org/presentationml/2006/main">
+  <p:cSld>
+    <p:spTree>
+      <p:nvGrpSpPr>
+        <p:cNvPr id="1" name=""/>
+        <p:cNvGrpSpPr/>
+        <p:nvPr/>
+      </p:nvGrpSpPr>
+      <p:grpSpPr>
+        <a:xfrm>
+          <a:off x="0" y="0"/>
+          <a:ext cx="0" cy="0"/>
+          <a:chOff x="0" y="0"/>
+          <a:chExt cx="0" cy="0"/>
+        </a:xfrm>
+      </p:grpSpPr>
+      <p:sp>
+        <p:nvSpPr>
+          <p:cNvPr id="2" name="Slide Image Placeholder 1"/>
+          <p:cNvSpPr>
+            <a:spLocks noGrp="1" noRot="1" noChangeAspect="1"/>
+          </p:cNvSpPr>
+          <p:nvPr>
+            <p:ph type="sldImg"/>
+          </p:nvPr>
+        </p:nvSpPr>
+        <p:spPr/>
+      </p:sp>
+      <p:sp>
+        <p:nvSpPr>
+          <p:cNvPr id="3" name="Notes Placeholder 2"/>
+          <p:cNvSpPr>
+            <a:spLocks noGrp="1"/>
+          </p:cNvSpPr>
+          <p:nvPr>
+            <p:ph type="body" idx="1"/>
+          </p:nvPr>
+        </p:nvSpPr>
+        <p:spPr/>
+        <p:txBody>
+          <a:bodyPr/>
+          <a:lstStyle/>
+          <a:p>
+            <a:r>
+              <a:rPr lang="en-US"/>
+              <a:t>Opmerking:</a:t>
+            </a:r>
+          </a:p>
+          <a:p>
+            <a:endParaRPr lang="en-US"/>
+          </a:p>
+          <a:p>
+            <a:r>
+              <a:rPr lang="en-US"/>
+              <a:t>Deze slide gebruiken als title, photos, video of dergelijke.</a:t>
+            </a:r>
+          </a:p>
+          <a:p>
+            <a:endParaRPr lang="en-US"/>
+          </a:p>
+          <a:p>
+            <a:r>
+              <a:rPr lang="en-US"/>
+              <a:t>AUB gecomprimeerde fotos gebruiken</a:t>
+            </a:r>
+          </a:p>
+          <a:p>
+            <a:endParaRPr lang="en-US"/>
+          </a:p>
+          <a:p>
+            <a:r>
+              <a:rPr lang="en-US"/>
+              <a:t>Indien video test of deze automatisch start</a:t>
+            </a:r>
+          </a:p>
+          <a:p>
+            <a:endParaRPr lang="en-US"/>
+          </a:p>
+          <a:p>
+            <a:r>
+              <a:rPr lang="en-US"/>
+              <a:t>Indien vragen mail ray@tedxamstelveen.com</a:t>
+            </a:r>
+          </a:p>
+        </p:txBody>
+      </p:sp>
+      <p:sp>
+        <p:nvSpPr>
+          <p:cNvPr id="4" name="Slide Number Placeholder 3"/>
+          <p:cNvSpPr>
+            <a:spLocks noGrp="1"/>
+          </p:cNvSpPr>
+          <p:nvPr>
+            <p:ph type="sldNum" sz="quarter" idx="5"/>
+          </p:nvPr>
+        </p:nvSpPr>
+        <p:spPr/>
+        <p:txBody>
+          <a:bodyPr/>
+          <a:lstStyle/>
+          <a:p>
+            <a:fld id="{E0FBD6F4-CD9B-584A-A34E-649C473A2777}" type="slidenum">
+              <a:rPr lang="en-US" smtClean="0"/>
+              <a:t>3</a:t>
+            </a:fld>
+            <a:endParaRPr lang="en-US"/>
+          </a:p>
+        </p:txBody>
+      </p:sp>
+    </p:spTree>
+    <p:extLst>
+      <p:ext uri="{BB962C8B-B14F-4D97-AF65-F5344CB8AC3E}">
+        <p14:creationId xmlns:p14="http://schemas.microsoft.com/office/powerpoint/2010/main" val="2138086878"/>
+      </p:ext>
+    </p:extLst>
+  </p:cSld>
+  <p:clrMapOvr>
+    <a:masterClrMapping/>
+  </p:clrMapOvr>
+</p:notes>
+</file>
+
+<file path=ppt/notesSlides/notesSlide4.xml><?xml version="1.0" encoding="utf-8"?>
+<p:notes xmlns:a="http://schemas.openxmlformats.org/drawingml/2006/main" xmlns:r="http://schemas.openxmlformats.org/officeDocument/2006/relationships" xmlns:p="http://schemas.openxmlformats.org/presentationml/2006/main">
+  <p:cSld>
+    <p:spTree>
+      <p:nvGrpSpPr>
+        <p:cNvPr id="1" name=""/>
+        <p:cNvGrpSpPr/>
+        <p:nvPr/>
+      </p:nvGrpSpPr>
+      <p:grpSpPr>
+        <a:xfrm>
+          <a:off x="0" y="0"/>
+          <a:ext cx="0" cy="0"/>
+          <a:chOff x="0" y="0"/>
+          <a:chExt cx="0" cy="0"/>
+        </a:xfrm>
+      </p:grpSpPr>
+      <p:sp>
+        <p:nvSpPr>
+          <p:cNvPr id="2" name="Slide Image Placeholder 1"/>
+          <p:cNvSpPr>
+            <a:spLocks noGrp="1" noRot="1" noChangeAspect="1"/>
+          </p:cNvSpPr>
+          <p:nvPr>
+            <p:ph type="sldImg"/>
+          </p:nvPr>
+        </p:nvSpPr>
+        <p:spPr/>
+      </p:sp>
+      <p:sp>
+        <p:nvSpPr>
+          <p:cNvPr id="3" name="Notes Placeholder 2"/>
+          <p:cNvSpPr>
+            <a:spLocks noGrp="1"/>
+          </p:cNvSpPr>
+          <p:nvPr>
+            <p:ph type="body" idx="1"/>
+          </p:nvPr>
+        </p:nvSpPr>
+        <p:spPr/>
+        <p:txBody>
+          <a:bodyPr/>
+          <a:lstStyle/>
+          <a:p>
+            <a:r>
+              <a:rPr lang="en-US"/>
+              <a:t>Opmerking:</a:t>
+            </a:r>
+          </a:p>
+          <a:p>
+            <a:endParaRPr lang="en-US"/>
+          </a:p>
+          <a:p>
+            <a:r>
+              <a:rPr lang="en-US"/>
+              <a:t>Deze slide gebruiken als title, photos, video of dergelijke.</a:t>
+            </a:r>
+          </a:p>
+          <a:p>
+            <a:endParaRPr lang="en-US"/>
+          </a:p>
+          <a:p>
+            <a:r>
+              <a:rPr lang="en-US"/>
+              <a:t>AUB gecomprimeerde fotos gebruiken</a:t>
+            </a:r>
+          </a:p>
+          <a:p>
+            <a:endParaRPr lang="en-US"/>
+          </a:p>
+          <a:p>
+            <a:r>
+              <a:rPr lang="en-US"/>
+              <a:t>Indien video test of deze automatisch start</a:t>
+            </a:r>
+          </a:p>
+          <a:p>
+            <a:endParaRPr lang="en-US"/>
+          </a:p>
+          <a:p>
+            <a:r>
+              <a:rPr lang="en-US"/>
+              <a:t>Indien vragen mail ray@tedxamstelveen.com</a:t>
+            </a:r>
+          </a:p>
+        </p:txBody>
+      </p:sp>
+      <p:sp>
+        <p:nvSpPr>
+          <p:cNvPr id="4" name="Slide Number Placeholder 3"/>
+          <p:cNvSpPr>
+            <a:spLocks noGrp="1"/>
+          </p:cNvSpPr>
+          <p:nvPr>
+            <p:ph type="sldNum" sz="quarter" idx="5"/>
+          </p:nvPr>
+        </p:nvSpPr>
+        <p:spPr/>
+        <p:txBody>
+          <a:bodyPr/>
+          <a:lstStyle/>
+          <a:p>
+            <a:fld id="{E0FBD6F4-CD9B-584A-A34E-649C473A2777}" type="slidenum">
+              <a:rPr lang="en-US" smtClean="0"/>
+              <a:t>4</a:t>
+            </a:fld>
+            <a:endParaRPr lang="en-US"/>
+          </a:p>
+        </p:txBody>
+      </p:sp>
+    </p:spTree>
+    <p:extLst>
+      <p:ext uri="{BB962C8B-B14F-4D97-AF65-F5344CB8AC3E}">
+        <p14:creationId xmlns:p14="http://schemas.microsoft.com/office/powerpoint/2010/main" val="1178188549"/>
+      </p:ext>
+    </p:extLst>
+  </p:cSld>
+  <p:clrMapOvr>
+    <a:masterClrMapping/>
+  </p:clrMapOvr>
+</p:notes>
+</file>
+
+<file path=ppt/notesSlides/notesSlide5.xml><?xml version="1.0" encoding="utf-8"?>
+<p:notes xmlns:a="http://schemas.openxmlformats.org/drawingml/2006/main" xmlns:r="http://schemas.openxmlformats.org/officeDocument/2006/relationships" xmlns:p="http://schemas.openxmlformats.org/presentationml/2006/main">
+  <p:cSld>
+    <p:spTree>
+      <p:nvGrpSpPr>
+        <p:cNvPr id="1" name=""/>
+        <p:cNvGrpSpPr/>
+        <p:nvPr/>
+      </p:nvGrpSpPr>
+      <p:grpSpPr>
+        <a:xfrm>
+          <a:off x="0" y="0"/>
+          <a:ext cx="0" cy="0"/>
+          <a:chOff x="0" y="0"/>
+          <a:chExt cx="0" cy="0"/>
+        </a:xfrm>
+      </p:grpSpPr>
+      <p:sp>
+        <p:nvSpPr>
+          <p:cNvPr id="2" name="Slide Image Placeholder 1"/>
+          <p:cNvSpPr>
+            <a:spLocks noGrp="1" noRot="1" noChangeAspect="1"/>
+          </p:cNvSpPr>
+          <p:nvPr>
+            <p:ph type="sldImg"/>
+          </p:nvPr>
+        </p:nvSpPr>
+        <p:spPr/>
+      </p:sp>
+      <p:sp>
+        <p:nvSpPr>
+          <p:cNvPr id="3" name="Notes Placeholder 2"/>
+          <p:cNvSpPr>
+            <a:spLocks noGrp="1"/>
+          </p:cNvSpPr>
+          <p:nvPr>
+            <p:ph type="body" idx="1"/>
+          </p:nvPr>
+        </p:nvSpPr>
+        <p:spPr/>
+        <p:txBody>
+          <a:bodyPr/>
+          <a:lstStyle/>
+          <a:p>
+            <a:r>
+              <a:rPr lang="en-US"/>
+              <a:t>Opmerking:</a:t>
+            </a:r>
+          </a:p>
+          <a:p>
+            <a:endParaRPr lang="en-US"/>
+          </a:p>
+          <a:p>
+            <a:r>
+              <a:rPr lang="en-US"/>
+              <a:t>Deze slide gebruiken als title, photos, video of dergelijke.</a:t>
+            </a:r>
+          </a:p>
+          <a:p>
+            <a:endParaRPr lang="en-US"/>
+          </a:p>
+          <a:p>
+            <a:r>
+              <a:rPr lang="en-US"/>
+              <a:t>AUB gecomprimeerde fotos gebruiken</a:t>
+            </a:r>
+          </a:p>
+          <a:p>
+            <a:endParaRPr lang="en-US"/>
+          </a:p>
+          <a:p>
+            <a:r>
+              <a:rPr lang="en-US"/>
+              <a:t>Indien video test of deze automatisch start</a:t>
+            </a:r>
+          </a:p>
+          <a:p>
+            <a:endParaRPr lang="en-US"/>
+          </a:p>
+          <a:p>
+            <a:r>
+              <a:rPr lang="en-US"/>
+              <a:t>Indien vragen mail ray@tedxamstelveen.com</a:t>
+            </a:r>
+          </a:p>
+        </p:txBody>
+      </p:sp>
+      <p:sp>
+        <p:nvSpPr>
+          <p:cNvPr id="4" name="Slide Number Placeholder 3"/>
+          <p:cNvSpPr>
+            <a:spLocks noGrp="1"/>
+          </p:cNvSpPr>
+          <p:nvPr>
+            <p:ph type="sldNum" sz="quarter" idx="5"/>
+          </p:nvPr>
+        </p:nvSpPr>
+        <p:spPr/>
+        <p:txBody>
+          <a:bodyPr/>
+          <a:lstStyle/>
+          <a:p>
+            <a:fld id="{E0FBD6F4-CD9B-584A-A34E-649C473A2777}" type="slidenum">
+              <a:rPr lang="en-US" smtClean="0"/>
+              <a:t>5</a:t>
+            </a:fld>
+            <a:endParaRPr lang="en-US"/>
+          </a:p>
+        </p:txBody>
+      </p:sp>
+    </p:spTree>
+    <p:extLst>
+      <p:ext uri="{BB962C8B-B14F-4D97-AF65-F5344CB8AC3E}">
+        <p14:creationId xmlns:p14="http://schemas.microsoft.com/office/powerpoint/2010/main" val="1091846901"/>
+      </p:ext>
+    </p:extLst>
+  </p:cSld>
+  <p:clrMapOvr>
+    <a:masterClrMapping/>
+  </p:clrMapOvr>
+</p:notes>
 </file>
 
 <file path=ppt/slideLayouts/slideLayout1.xml><?xml version="1.0" encoding="utf-8"?>
@@ -3276,7 +3893,7 @@
     </p:spTree>
     <p:extLst>
       <p:ext uri="{BB962C8B-B14F-4D97-AF65-F5344CB8AC3E}">
-        <p14:creationId xmlns:p14="http://schemas.microsoft.com/office/powerpoint/2010/main" val="326794958"/>
+        <p14:creationId xmlns:p14="http://schemas.microsoft.com/office/powerpoint/2010/main" val="1421884543"/>
       </p:ext>
     </p:extLst>
   </p:cSld>
@@ -3325,7 +3942,7 @@
     </p:spTree>
     <p:extLst>
       <p:ext uri="{BB962C8B-B14F-4D97-AF65-F5344CB8AC3E}">
-        <p14:creationId xmlns:p14="http://schemas.microsoft.com/office/powerpoint/2010/main" val="1814591370"/>
+        <p14:creationId xmlns:p14="http://schemas.microsoft.com/office/powerpoint/2010/main" val="3794259064"/>
       </p:ext>
     </p:extLst>
   </p:cSld>
@@ -3374,7 +3991,105 @@
     </p:spTree>
     <p:extLst>
       <p:ext uri="{BB962C8B-B14F-4D97-AF65-F5344CB8AC3E}">
-        <p14:creationId xmlns:p14="http://schemas.microsoft.com/office/powerpoint/2010/main" val="1421884543"/>
+        <p14:creationId xmlns:p14="http://schemas.microsoft.com/office/powerpoint/2010/main" val="1616637443"/>
+      </p:ext>
+    </p:extLst>
+  </p:cSld>
+  <p:clrMapOvr>
+    <a:masterClrMapping/>
+  </p:clrMapOvr>
+</p:sld>
+</file>
+
+<file path=ppt/slides/slide4.xml><?xml version="1.0" encoding="utf-8"?>
+<p:sld xmlns:a="http://schemas.openxmlformats.org/drawingml/2006/main" xmlns:r="http://schemas.openxmlformats.org/officeDocument/2006/relationships" xmlns:p="http://schemas.openxmlformats.org/presentationml/2006/main">
+  <p:cSld>
+    <p:spTree>
+      <p:nvGrpSpPr>
+        <p:cNvPr id="1" name=""/>
+        <p:cNvGrpSpPr/>
+        <p:nvPr/>
+      </p:nvGrpSpPr>
+      <p:grpSpPr>
+        <a:xfrm>
+          <a:off x="0" y="0"/>
+          <a:ext cx="0" cy="0"/>
+          <a:chOff x="0" y="0"/>
+          <a:chExt cx="0" cy="0"/>
+        </a:xfrm>
+      </p:grpSpPr>
+      <p:sp>
+        <p:nvSpPr>
+          <p:cNvPr id="2" name="Title 1"/>
+          <p:cNvSpPr>
+            <a:spLocks noGrp="1"/>
+          </p:cNvSpPr>
+          <p:nvPr>
+            <p:ph type="title"/>
+          </p:nvPr>
+        </p:nvSpPr>
+        <p:spPr/>
+        <p:txBody>
+          <a:bodyPr/>
+          <a:lstStyle/>
+          <a:p>
+            <a:endParaRPr lang="en-US"/>
+          </a:p>
+        </p:txBody>
+      </p:sp>
+    </p:spTree>
+    <p:extLst>
+      <p:ext uri="{BB962C8B-B14F-4D97-AF65-F5344CB8AC3E}">
+        <p14:creationId xmlns:p14="http://schemas.microsoft.com/office/powerpoint/2010/main" val="3507148157"/>
+      </p:ext>
+    </p:extLst>
+  </p:cSld>
+  <p:clrMapOvr>
+    <a:masterClrMapping/>
+  </p:clrMapOvr>
+</p:sld>
+</file>
+
+<file path=ppt/slides/slide5.xml><?xml version="1.0" encoding="utf-8"?>
+<p:sld xmlns:a="http://schemas.openxmlformats.org/drawingml/2006/main" xmlns:r="http://schemas.openxmlformats.org/officeDocument/2006/relationships" xmlns:p="http://schemas.openxmlformats.org/presentationml/2006/main">
+  <p:cSld>
+    <p:spTree>
+      <p:nvGrpSpPr>
+        <p:cNvPr id="1" name=""/>
+        <p:cNvGrpSpPr/>
+        <p:nvPr/>
+      </p:nvGrpSpPr>
+      <p:grpSpPr>
+        <a:xfrm>
+          <a:off x="0" y="0"/>
+          <a:ext cx="0" cy="0"/>
+          <a:chOff x="0" y="0"/>
+          <a:chExt cx="0" cy="0"/>
+        </a:xfrm>
+      </p:grpSpPr>
+      <p:sp>
+        <p:nvSpPr>
+          <p:cNvPr id="2" name="Title 1"/>
+          <p:cNvSpPr>
+            <a:spLocks noGrp="1"/>
+          </p:cNvSpPr>
+          <p:nvPr>
+            <p:ph type="title"/>
+          </p:nvPr>
+        </p:nvSpPr>
+        <p:spPr/>
+        <p:txBody>
+          <a:bodyPr/>
+          <a:lstStyle/>
+          <a:p>
+            <a:endParaRPr lang="en-US"/>
+          </a:p>
+        </p:txBody>
+      </p:sp>
+    </p:spTree>
+    <p:extLst>
+      <p:ext uri="{BB962C8B-B14F-4D97-AF65-F5344CB8AC3E}">
+        <p14:creationId xmlns:p14="http://schemas.microsoft.com/office/powerpoint/2010/main" val="2989097036"/>
       </p:ext>
     </p:extLst>
   </p:cSld>

</xml_diff>